<commit_message>
Added CNN encoder with ansemble CNNs and trees
</commit_message>
<xml_diff>
--- a/Meeting Presentations/02.03.2023_General_Meeting.pptx
+++ b/Meeting Presentations/02.03.2023_General_Meeting.pptx
@@ -274,7 +274,7 @@
           <a:p>
             <a:fld id="{098A0168-EB40-45AF-89A1-87DE0A55FFC6}" type="datetime1">
               <a:rPr lang="en-US" smtClean="0"/>
-              <a:t>2/28/2023</a:t>
+              <a:t>3/2/2023</a:t>
             </a:fld>
             <a:endParaRPr lang="en-US"/>
           </a:p>
@@ -485,7 +485,7 @@
           <a:p>
             <a:fld id="{8F8CA68F-747D-436A-B5BB-2EBC3ED499E4}" type="datetime1">
               <a:rPr lang="en-US" smtClean="0"/>
-              <a:t>2/28/2023</a:t>
+              <a:t>3/2/2023</a:t>
             </a:fld>
             <a:endParaRPr lang="en-US"/>
           </a:p>
@@ -700,7 +700,7 @@
           <a:p>
             <a:fld id="{6DD8DC11-9E39-40A0-B3DC-E3F2AD04A616}" type="datetime1">
               <a:rPr lang="en-US" smtClean="0"/>
-              <a:t>2/28/2023</a:t>
+              <a:t>3/2/2023</a:t>
             </a:fld>
             <a:endParaRPr lang="en-US"/>
           </a:p>
@@ -901,7 +901,7 @@
           <a:p>
             <a:fld id="{BE0A88F0-556B-4BB7-8AAB-D63AEB65C662}" type="datetime1">
               <a:rPr lang="en-US" smtClean="0"/>
-              <a:t>2/28/2023</a:t>
+              <a:t>3/2/2023</a:t>
             </a:fld>
             <a:endParaRPr lang="en-US"/>
           </a:p>
@@ -1180,7 +1180,7 @@
           <a:p>
             <a:fld id="{60E05506-6815-4E0E-B1DE-ECA35C2016DF}" type="datetime1">
               <a:rPr lang="en-US" smtClean="0"/>
-              <a:t>2/28/2023</a:t>
+              <a:t>3/2/2023</a:t>
             </a:fld>
             <a:endParaRPr lang="en-US"/>
           </a:p>
@@ -1448,7 +1448,7 @@
           <a:p>
             <a:fld id="{FC6E85F7-A724-48A4-9D33-CEBC5174E865}" type="datetime1">
               <a:rPr lang="en-US" smtClean="0"/>
-              <a:t>2/28/2023</a:t>
+              <a:t>3/2/2023</a:t>
             </a:fld>
             <a:endParaRPr lang="en-US"/>
           </a:p>
@@ -1864,7 +1864,7 @@
           <a:p>
             <a:fld id="{42806E7A-BDD3-46A3-BEE2-EB821F9236B4}" type="datetime1">
               <a:rPr lang="en-US" smtClean="0"/>
-              <a:t>2/28/2023</a:t>
+              <a:t>3/2/2023</a:t>
             </a:fld>
             <a:endParaRPr lang="en-US"/>
           </a:p>
@@ -2013,7 +2013,7 @@
           <a:p>
             <a:fld id="{9ED1540C-9440-4E7A-B71A-BEFEE06869E3}" type="datetime1">
               <a:rPr lang="en-US" smtClean="0"/>
-              <a:t>2/28/2023</a:t>
+              <a:t>3/2/2023</a:t>
             </a:fld>
             <a:endParaRPr lang="en-US"/>
           </a:p>
@@ -2139,7 +2139,7 @@
           <a:p>
             <a:fld id="{E0318DDB-88AC-4039-B59C-B05DC4C9C16C}" type="datetime1">
               <a:rPr lang="en-US" smtClean="0"/>
-              <a:t>2/28/2023</a:t>
+              <a:t>3/2/2023</a:t>
             </a:fld>
             <a:endParaRPr lang="en-US"/>
           </a:p>
@@ -2390,7 +2390,7 @@
           <a:p>
             <a:fld id="{E082ABFB-60E7-4BA1-866A-7059F058065B}" type="datetime1">
               <a:rPr lang="en-US" smtClean="0"/>
-              <a:t>2/28/2023</a:t>
+              <a:t>3/2/2023</a:t>
             </a:fld>
             <a:endParaRPr lang="en-US"/>
           </a:p>
@@ -2835,7 +2835,7 @@
           <a:p>
             <a:fld id="{2694112F-55F4-4776-A323-7418930321C8}" type="datetime1">
               <a:rPr lang="en-US" smtClean="0"/>
-              <a:t>2/28/2023</a:t>
+              <a:t>3/2/2023</a:t>
             </a:fld>
             <a:endParaRPr lang="en-US"/>
           </a:p>
@@ -3162,7 +3162,7 @@
           <a:p>
             <a:fld id="{CFBEA57F-793F-4683-BD8A-741FD4B89154}" type="datetime1">
               <a:rPr lang="en-US" smtClean="0"/>
-              <a:t>2/28/2023</a:t>
+              <a:t>3/2/2023</a:t>
             </a:fld>
             <a:endParaRPr lang="en-US" dirty="0"/>
           </a:p>
@@ -3810,43 +3810,6 @@
           </a:p>
         </p:txBody>
       </p:sp>
-      <p:sp>
-        <p:nvSpPr>
-          <p:cNvPr id="3" name="Subtitle 2">
-            <a:extLst>
-              <a:ext uri="{FF2B5EF4-FFF2-40B4-BE49-F238E27FC236}">
-                <a16:creationId xmlns:a16="http://schemas.microsoft.com/office/drawing/2014/main" id="{C366703B-55BA-0871-962A-76ACA8A1836E}"/>
-              </a:ext>
-            </a:extLst>
-          </p:cNvPr>
-          <p:cNvSpPr>
-            <a:spLocks noGrp="1"/>
-          </p:cNvSpPr>
-          <p:nvPr>
-            <p:ph type="subTitle" idx="1"/>
-          </p:nvPr>
-        </p:nvSpPr>
-        <p:spPr>
-          <a:xfrm>
-            <a:off x="1300525" y="4669144"/>
-            <a:ext cx="6829043" cy="716529"/>
-          </a:xfrm>
-        </p:spPr>
-        <p:txBody>
-          <a:bodyPr>
-            <a:normAutofit/>
-          </a:bodyPr>
-          <a:lstStyle/>
-          <a:p>
-            <a:pPr algn="r"/>
-            <a:endParaRPr lang="en-GB" sz="1600">
-              <a:solidFill>
-                <a:srgbClr val="FFFFFE"/>
-              </a:solidFill>
-            </a:endParaRPr>
-          </a:p>
-        </p:txBody>
-      </p:sp>
       <p:cxnSp>
         <p:nvCxnSpPr>
           <p:cNvPr id="11" name="Straight Connector 10">
@@ -4045,27 +4008,93 @@
             </a:r>
             <a:r>
               <a:rPr lang="nb-NO" dirty="0"/>
-              <a:t> </a:t>
-            </a:r>
-            <a:r>
-              <a:rPr lang="nb-NO" dirty="0" err="1"/>
-              <a:t>on</a:t>
-            </a:r>
-            <a:r>
-              <a:rPr lang="nb-NO" dirty="0"/>
-              <a:t> general, </a:t>
-            </a:r>
-            <a:r>
-              <a:rPr lang="nb-NO" dirty="0" err="1"/>
-              <a:t>but</a:t>
-            </a:r>
-            <a:r>
-              <a:rPr lang="nb-NO" dirty="0"/>
-              <a:t> has </a:t>
-            </a:r>
-            <a:r>
-              <a:rPr lang="nb-NO" dirty="0" err="1"/>
-              <a:t>some</a:t>
+              <a:t> in general</a:t>
+            </a:r>
+          </a:p>
+          <a:p>
+            <a:pPr lvl="1"/>
+            <a:r>
+              <a:rPr lang="nb-NO" dirty="0" err="1"/>
+              <a:t>Reducing</a:t>
+            </a:r>
+            <a:r>
+              <a:rPr lang="nb-NO" dirty="0"/>
+              <a:t> </a:t>
+            </a:r>
+            <a:r>
+              <a:rPr lang="nb-NO" dirty="0" err="1"/>
+              <a:t>the</a:t>
+            </a:r>
+            <a:r>
+              <a:rPr lang="nb-NO" dirty="0"/>
+              <a:t> bias </a:t>
+            </a:r>
+            <a:r>
+              <a:rPr lang="nb-NO" dirty="0" err="1"/>
+              <a:t>of</a:t>
+            </a:r>
+            <a:r>
+              <a:rPr lang="nb-NO" dirty="0"/>
+              <a:t> </a:t>
+            </a:r>
+            <a:r>
+              <a:rPr lang="nb-NO" dirty="0" err="1"/>
+              <a:t>the</a:t>
+            </a:r>
+            <a:r>
+              <a:rPr lang="nb-NO" dirty="0"/>
+              <a:t> </a:t>
+            </a:r>
+            <a:r>
+              <a:rPr lang="nb-NO" dirty="0" err="1"/>
+              <a:t>tree</a:t>
+            </a:r>
+            <a:r>
+              <a:rPr lang="nb-NO" dirty="0"/>
+              <a:t> </a:t>
+            </a:r>
+            <a:r>
+              <a:rPr lang="nb-NO" dirty="0" err="1"/>
+              <a:t>predictors</a:t>
+            </a:r>
+            <a:endParaRPr lang="nb-NO" dirty="0"/>
+          </a:p>
+          <a:p>
+            <a:pPr lvl="1"/>
+            <a:r>
+              <a:rPr lang="nb-NO" dirty="0" err="1"/>
+              <a:t>Increasing</a:t>
+            </a:r>
+            <a:r>
+              <a:rPr lang="nb-NO" dirty="0"/>
+              <a:t> </a:t>
+            </a:r>
+            <a:r>
+              <a:rPr lang="nb-NO" dirty="0" err="1"/>
+              <a:t>the</a:t>
+            </a:r>
+            <a:r>
+              <a:rPr lang="nb-NO" dirty="0"/>
+              <a:t> </a:t>
+            </a:r>
+            <a:r>
+              <a:rPr lang="nb-NO" dirty="0" err="1"/>
+              <a:t>correlation</a:t>
+            </a:r>
+            <a:endParaRPr lang="nb-NO" dirty="0"/>
+          </a:p>
+          <a:p>
+            <a:r>
+              <a:rPr lang="nb-NO" dirty="0" err="1"/>
+              <a:t>There</a:t>
+            </a:r>
+            <a:r>
+              <a:rPr lang="nb-NO" dirty="0"/>
+              <a:t> </a:t>
+            </a:r>
+            <a:r>
+              <a:rPr lang="nb-NO" dirty="0" err="1"/>
+              <a:t>are</a:t>
             </a:r>
             <a:r>
               <a:rPr lang="nb-NO" dirty="0"/>
@@ -4083,7 +4112,34 @@
               <a:rPr lang="nb-NO" dirty="0" err="1"/>
               <a:t>values</a:t>
             </a:r>
-            <a:endParaRPr lang="nb-NO" dirty="0"/>
+            <a:r>
+              <a:rPr lang="nb-NO" dirty="0"/>
+              <a:t> </a:t>
+            </a:r>
+            <a:r>
+              <a:rPr lang="nb-NO" dirty="0" err="1"/>
+              <a:t>that</a:t>
+            </a:r>
+            <a:r>
+              <a:rPr lang="nb-NO" dirty="0"/>
+              <a:t> </a:t>
+            </a:r>
+            <a:r>
+              <a:rPr lang="nb-NO" dirty="0" err="1"/>
+              <a:t>likely</a:t>
+            </a:r>
+            <a:r>
+              <a:rPr lang="nb-NO" dirty="0"/>
+              <a:t> stem from </a:t>
+            </a:r>
+            <a:r>
+              <a:rPr lang="nb-NO" dirty="0" err="1"/>
+              <a:t>overfitting</a:t>
+            </a:r>
+            <a:r>
+              <a:rPr lang="nb-NO" dirty="0"/>
+              <a:t> to training data</a:t>
+            </a:r>
           </a:p>
           <a:p>
             <a:r>
@@ -4236,7 +4292,7 @@
           <a:p>
             <a:fld id="{BE0A88F0-556B-4BB7-8AAB-D63AEB65C662}" type="datetime1">
               <a:rPr lang="en-US" smtClean="0"/>
-              <a:t>3/1/2023</a:t>
+              <a:t>3/2/2023</a:t>
             </a:fld>
             <a:endParaRPr lang="en-US"/>
           </a:p>
@@ -4318,7 +4374,7 @@
         </p:blipFill>
         <p:spPr>
           <a:xfrm>
-            <a:off x="1451579" y="3875720"/>
+            <a:off x="1451579" y="4681064"/>
             <a:ext cx="6610350" cy="1181100"/>
           </a:xfrm>
           <a:prstGeom prst="rect">
@@ -4597,7 +4653,7 @@
           <a:p>
             <a:fld id="{BE0A88F0-556B-4BB7-8AAB-D63AEB65C662}" type="datetime1">
               <a:rPr lang="en-US" smtClean="0"/>
-              <a:t>3/1/2023</a:t>
+              <a:t>3/2/2023</a:t>
             </a:fld>
             <a:endParaRPr lang="en-US"/>
           </a:p>
@@ -5493,7 +5549,7 @@
                   <a:spcPts val="600"/>
                 </a:spcAft>
               </a:pPr>
-              <a:t>3/1/2023</a:t>
+              <a:t>3/2/2023</a:t>
             </a:fld>
             <a:endParaRPr lang="en-US"/>
           </a:p>
@@ -6133,7 +6189,15 @@
             </a:r>
             <a:r>
               <a:rPr lang="nb-NO" dirty="0"/>
-              <a:t> from 30m to 100</a:t>
+              <a:t> from </a:t>
+            </a:r>
+            <a:r>
+              <a:rPr lang="nb-NO" dirty="0" err="1"/>
+              <a:t>depth</a:t>
+            </a:r>
+            <a:r>
+              <a:rPr lang="nb-NO" dirty="0"/>
+              <a:t> 30m to 100</a:t>
             </a:r>
             <a:r>
               <a:rPr lang="en-GB" dirty="0"/>
@@ -6232,7 +6296,7 @@
                   <a:spcPts val="600"/>
                 </a:spcAft>
               </a:pPr>
-              <a:t>2/28/2023</a:t>
+              <a:t>3/2/2023</a:t>
             </a:fld>
             <a:endParaRPr lang="en-US"/>
           </a:p>
@@ -6941,7 +7005,7 @@
                   <a:spcPts val="600"/>
                 </a:spcAft>
               </a:pPr>
-              <a:t>2/28/2023</a:t>
+              <a:t>3/2/2023</a:t>
             </a:fld>
             <a:endParaRPr lang="en-US"/>
           </a:p>
@@ -7798,7 +7862,7 @@
                   <a:spcPts val="600"/>
                 </a:spcAft>
               </a:pPr>
-              <a:t>2/28/2023</a:t>
+              <a:t>3/2/2023</a:t>
             </a:fld>
             <a:endParaRPr lang="en-US"/>
           </a:p>
@@ -8237,7 +8301,7 @@
           <a:p>
             <a:fld id="{BE0A88F0-556B-4BB7-8AAB-D63AEB65C662}" type="datetime1">
               <a:rPr lang="en-US" smtClean="0"/>
-              <a:t>2/28/2023</a:t>
+              <a:t>3/2/2023</a:t>
             </a:fld>
             <a:endParaRPr lang="en-US"/>
           </a:p>
@@ -8415,6 +8479,58 @@
             </a:r>
           </a:p>
           <a:p>
+            <a:pPr lvl="1"/>
+            <a:r>
+              <a:rPr lang="nb-NO" dirty="0"/>
+              <a:t>The </a:t>
+            </a:r>
+            <a:r>
+              <a:rPr lang="nb-NO" dirty="0" err="1"/>
+              <a:t>dataset</a:t>
+            </a:r>
+            <a:r>
+              <a:rPr lang="nb-NO" dirty="0"/>
+              <a:t> </a:t>
+            </a:r>
+            <a:r>
+              <a:rPr lang="nb-NO" dirty="0" err="1"/>
+              <a:t>should</a:t>
+            </a:r>
+            <a:r>
+              <a:rPr lang="nb-NO" dirty="0"/>
+              <a:t> be as </a:t>
+            </a:r>
+            <a:r>
+              <a:rPr lang="nb-NO" dirty="0" err="1"/>
+              <a:t>complete</a:t>
+            </a:r>
+            <a:r>
+              <a:rPr lang="nb-NO" dirty="0"/>
+              <a:t> as </a:t>
+            </a:r>
+            <a:r>
+              <a:rPr lang="nb-NO" dirty="0" err="1"/>
+              <a:t>possible</a:t>
+            </a:r>
+            <a:r>
+              <a:rPr lang="nb-NO" dirty="0"/>
+              <a:t> </a:t>
+            </a:r>
+            <a:r>
+              <a:rPr lang="nb-NO" dirty="0" err="1"/>
+              <a:t>without</a:t>
+            </a:r>
+            <a:r>
+              <a:rPr lang="nb-NO" dirty="0"/>
+              <a:t> </a:t>
+            </a:r>
+            <a:r>
+              <a:rPr lang="nb-NO" dirty="0" err="1"/>
+              <a:t>either</a:t>
+            </a:r>
+            <a:endParaRPr lang="nb-NO" dirty="0"/>
+          </a:p>
+          <a:p>
             <a:r>
               <a:rPr lang="nb-NO" dirty="0" err="1"/>
               <a:t>What</a:t>
@@ -8564,7 +8680,7 @@
           <a:p>
             <a:fld id="{BE0A88F0-556B-4BB7-8AAB-D63AEB65C662}" type="datetime1">
               <a:rPr lang="en-US" smtClean="0"/>
-              <a:t>3/1/2023</a:t>
+              <a:t>3/2/2023</a:t>
             </a:fld>
             <a:endParaRPr lang="en-US"/>
           </a:p>
@@ -8955,6 +9071,204 @@
               <a:rPr lang="nb-NO" dirty="0" err="1"/>
               <a:t>depth</a:t>
             </a:r>
+            <a:r>
+              <a:rPr lang="nb-NO" dirty="0"/>
+              <a:t> / </a:t>
+            </a:r>
+            <a:r>
+              <a:rPr lang="nb-NO" dirty="0" err="1"/>
+              <a:t>Transition</a:t>
+            </a:r>
+            <a:r>
+              <a:rPr lang="nb-NO" dirty="0"/>
+              <a:t> from PCPT to BH-CPT</a:t>
+            </a:r>
+          </a:p>
+          <a:p>
+            <a:pPr lvl="1"/>
+            <a:r>
+              <a:rPr lang="nb-NO" dirty="0"/>
+              <a:t>AVO </a:t>
+            </a:r>
+            <a:r>
+              <a:rPr lang="nb-NO" dirty="0" err="1"/>
+              <a:t>attributes</a:t>
+            </a:r>
+            <a:r>
+              <a:rPr lang="nb-NO" dirty="0"/>
+              <a:t> </a:t>
+            </a:r>
+            <a:r>
+              <a:rPr lang="nb-NO" dirty="0" err="1"/>
+              <a:t>represent</a:t>
+            </a:r>
+            <a:r>
+              <a:rPr lang="nb-NO" dirty="0"/>
+              <a:t> a </a:t>
+            </a:r>
+            <a:r>
+              <a:rPr lang="nb-NO" dirty="0" err="1"/>
+              <a:t>wider</a:t>
+            </a:r>
+            <a:r>
+              <a:rPr lang="nb-NO" dirty="0"/>
+              <a:t> </a:t>
+            </a:r>
+            <a:r>
+              <a:rPr lang="nb-NO" dirty="0" err="1"/>
+              <a:t>spectrum</a:t>
+            </a:r>
+            <a:r>
+              <a:rPr lang="nb-NO" dirty="0"/>
+              <a:t> </a:t>
+            </a:r>
+            <a:r>
+              <a:rPr lang="nb-NO" dirty="0" err="1"/>
+              <a:t>of</a:t>
+            </a:r>
+            <a:r>
+              <a:rPr lang="nb-NO" dirty="0"/>
+              <a:t> angles </a:t>
+            </a:r>
+            <a:r>
+              <a:rPr lang="nb-NO" dirty="0" err="1"/>
+              <a:t>near</a:t>
+            </a:r>
+            <a:r>
+              <a:rPr lang="nb-NO" dirty="0"/>
+              <a:t> </a:t>
+            </a:r>
+            <a:r>
+              <a:rPr lang="nb-NO" dirty="0" err="1"/>
+              <a:t>the</a:t>
+            </a:r>
+            <a:r>
+              <a:rPr lang="nb-NO" dirty="0"/>
+              <a:t> </a:t>
+            </a:r>
+            <a:r>
+              <a:rPr lang="nb-NO" dirty="0" err="1"/>
+              <a:t>surface</a:t>
+            </a:r>
+            <a:endParaRPr lang="nb-NO" dirty="0"/>
+          </a:p>
+          <a:p>
+            <a:pPr lvl="1"/>
+            <a:r>
+              <a:rPr lang="nb-NO" dirty="0"/>
+              <a:t>Using </a:t>
+            </a:r>
+            <a:r>
+              <a:rPr lang="nb-NO" dirty="0" err="1"/>
+              <a:t>the</a:t>
+            </a:r>
+            <a:r>
+              <a:rPr lang="nb-NO" dirty="0"/>
+              <a:t> ML </a:t>
+            </a:r>
+            <a:r>
+              <a:rPr lang="nb-NO" dirty="0" err="1"/>
+              <a:t>features</a:t>
+            </a:r>
+            <a:r>
+              <a:rPr lang="nb-NO" dirty="0"/>
+              <a:t> </a:t>
+            </a:r>
+            <a:r>
+              <a:rPr lang="nb-NO" dirty="0" err="1"/>
+              <a:t>allows</a:t>
+            </a:r>
+            <a:r>
+              <a:rPr lang="nb-NO" dirty="0"/>
+              <a:t> </a:t>
+            </a:r>
+            <a:r>
+              <a:rPr lang="nb-NO" dirty="0" err="1"/>
+              <a:t>us</a:t>
+            </a:r>
+            <a:r>
+              <a:rPr lang="nb-NO" dirty="0"/>
+              <a:t> to </a:t>
+            </a:r>
+            <a:r>
+              <a:rPr lang="nb-NO" dirty="0" err="1"/>
+              <a:t>sidestep</a:t>
+            </a:r>
+            <a:r>
+              <a:rPr lang="nb-NO" dirty="0"/>
+              <a:t> </a:t>
+            </a:r>
+            <a:r>
+              <a:rPr lang="nb-NO" dirty="0" err="1"/>
+              <a:t>some</a:t>
+            </a:r>
+            <a:r>
+              <a:rPr lang="nb-NO" dirty="0"/>
+              <a:t> </a:t>
+            </a:r>
+            <a:r>
+              <a:rPr lang="nb-NO" dirty="0" err="1"/>
+              <a:t>assumptions</a:t>
+            </a:r>
+            <a:r>
+              <a:rPr lang="nb-NO" dirty="0"/>
+              <a:t> like normal </a:t>
+            </a:r>
+            <a:r>
+              <a:rPr lang="nb-NO" dirty="0" err="1"/>
+              <a:t>incidence</a:t>
+            </a:r>
+            <a:r>
+              <a:rPr lang="nb-NO" dirty="0"/>
+              <a:t> </a:t>
+            </a:r>
+            <a:r>
+              <a:rPr lang="nb-NO" dirty="0" err="1"/>
+              <a:t>reflection</a:t>
+            </a:r>
+            <a:endParaRPr lang="nb-NO" dirty="0"/>
+          </a:p>
+          <a:p>
+            <a:pPr lvl="1"/>
+            <a:r>
+              <a:rPr lang="nb-NO" dirty="0"/>
+              <a:t>The </a:t>
+            </a:r>
+            <a:r>
+              <a:rPr lang="nb-NO" dirty="0" err="1"/>
+              <a:t>distance</a:t>
+            </a:r>
+            <a:r>
+              <a:rPr lang="nb-NO" dirty="0"/>
+              <a:t> </a:t>
+            </a:r>
+            <a:r>
+              <a:rPr lang="nb-NO" dirty="0" err="1"/>
+              <a:t>between</a:t>
+            </a:r>
+            <a:r>
+              <a:rPr lang="nb-NO" dirty="0"/>
+              <a:t> </a:t>
+            </a:r>
+            <a:r>
+              <a:rPr lang="nb-NO" dirty="0" err="1"/>
+              <a:t>seismic</a:t>
+            </a:r>
+            <a:r>
+              <a:rPr lang="nb-NO" dirty="0"/>
+              <a:t> and </a:t>
+            </a:r>
+            <a:r>
+              <a:rPr lang="nb-NO" dirty="0" err="1"/>
+              <a:t>nearest</a:t>
+            </a:r>
+            <a:r>
+              <a:rPr lang="nb-NO" dirty="0"/>
+              <a:t> CDP</a:t>
+            </a:r>
+          </a:p>
+          <a:p>
+            <a:pPr lvl="1"/>
             <a:endParaRPr lang="nb-NO" dirty="0"/>
           </a:p>
           <a:p>
@@ -8986,7 +9300,7 @@
           <a:p>
             <a:fld id="{BE0A88F0-556B-4BB7-8AAB-D63AEB65C662}" type="datetime1">
               <a:rPr lang="en-US" smtClean="0"/>
-              <a:t>2/28/2023</a:t>
+              <a:t>3/2/2023</a:t>
             </a:fld>
             <a:endParaRPr lang="en-US"/>
           </a:p>
@@ -9289,7 +9603,7 @@
             <a:pPr lvl="3"/>
             <a:r>
               <a:rPr lang="en-GB" dirty="0"/>
-              <a:t>Con: Train a tree for every training step (slow)</a:t>
+              <a:t>Con: Train trees for every training step (slow)</a:t>
             </a:r>
           </a:p>
           <a:p>
@@ -9331,7 +9645,7 @@
           <a:p>
             <a:fld id="{BE0A88F0-556B-4BB7-8AAB-D63AEB65C662}" type="datetime1">
               <a:rPr lang="en-US" smtClean="0"/>
-              <a:t>2/28/2023</a:t>
+              <a:t>3/2/2023</a:t>
             </a:fld>
             <a:endParaRPr lang="en-US"/>
           </a:p>
@@ -9627,7 +9941,7 @@
           <a:p>
             <a:fld id="{BE0A88F0-556B-4BB7-8AAB-D63AEB65C662}" type="datetime1">
               <a:rPr lang="en-US" smtClean="0"/>
-              <a:t>2/28/2023</a:t>
+              <a:t>3/2/2023</a:t>
             </a:fld>
             <a:endParaRPr lang="en-US"/>
           </a:p>
@@ -10170,7 +10484,7 @@
           <a:p>
             <a:fld id="{BE0A88F0-556B-4BB7-8AAB-D63AEB65C662}" type="datetime1">
               <a:rPr lang="en-US" smtClean="0"/>
-              <a:t>2/28/2023</a:t>
+              <a:t>3/2/2023</a:t>
             </a:fld>
             <a:endParaRPr lang="en-US"/>
           </a:p>
@@ -10327,31 +10641,6 @@
       </p:sp>
       <p:sp>
         <p:nvSpPr>
-          <p:cNvPr id="3" name="Content Placeholder 2">
-            <a:extLst>
-              <a:ext uri="{FF2B5EF4-FFF2-40B4-BE49-F238E27FC236}">
-                <a16:creationId xmlns:a16="http://schemas.microsoft.com/office/drawing/2014/main" id="{0E8C5F3A-42F9-2335-2E5B-1B25B189CF69}"/>
-              </a:ext>
-            </a:extLst>
-          </p:cNvPr>
-          <p:cNvSpPr>
-            <a:spLocks noGrp="1"/>
-          </p:cNvSpPr>
-          <p:nvPr>
-            <p:ph idx="1"/>
-          </p:nvPr>
-        </p:nvSpPr>
-        <p:spPr/>
-        <p:txBody>
-          <a:bodyPr/>
-          <a:lstStyle/>
-          <a:p>
-            <a:endParaRPr lang="en-GB"/>
-          </a:p>
-        </p:txBody>
-      </p:sp>
-      <p:sp>
-        <p:nvSpPr>
           <p:cNvPr id="4" name="Date Placeholder 3">
             <a:extLst>
               <a:ext uri="{FF2B5EF4-FFF2-40B4-BE49-F238E27FC236}">
@@ -10373,7 +10662,7 @@
           <a:p>
             <a:fld id="{BE0A88F0-556B-4BB7-8AAB-D63AEB65C662}" type="datetime1">
               <a:rPr lang="en-US" smtClean="0"/>
-              <a:t>2/28/2023</a:t>
+              <a:t>3/2/2023</a:t>
             </a:fld>
             <a:endParaRPr lang="en-US"/>
           </a:p>
@@ -10455,8 +10744,8 @@
         </p:blipFill>
         <p:spPr>
           <a:xfrm>
-            <a:off x="2652712" y="2733675"/>
-            <a:ext cx="6886575" cy="1390650"/>
+            <a:off x="1451579" y="2818700"/>
+            <a:ext cx="8708832" cy="1758630"/>
           </a:xfrm>
           <a:prstGeom prst="rect">
             <a:avLst/>
@@ -11122,7 +11411,7 @@
                   <a:spcPts val="600"/>
                 </a:spcAft>
               </a:pPr>
-              <a:t>2/28/2023</a:t>
+              <a:t>3/2/2023</a:t>
             </a:fld>
             <a:endParaRPr lang="en-US"/>
           </a:p>
@@ -11358,6 +11647,74 @@
           </a:p>
         </p:txBody>
       </p:sp>
+      <p:sp>
+        <p:nvSpPr>
+          <p:cNvPr id="7" name="TextBox 6">
+            <a:extLst>
+              <a:ext uri="{FF2B5EF4-FFF2-40B4-BE49-F238E27FC236}">
+                <a16:creationId xmlns:a16="http://schemas.microsoft.com/office/drawing/2014/main" id="{133DFF3C-2391-225B-9CC8-C1EBDD55D9E2}"/>
+              </a:ext>
+            </a:extLst>
+          </p:cNvPr>
+          <p:cNvSpPr txBox="1"/>
+          <p:nvPr/>
+        </p:nvSpPr>
+        <p:spPr>
+          <a:xfrm>
+            <a:off x="8279934" y="4668277"/>
+            <a:ext cx="3077872" cy="369332"/>
+          </a:xfrm>
+          <a:prstGeom prst="rect">
+            <a:avLst/>
+          </a:prstGeom>
+          <a:noFill/>
+        </p:spPr>
+        <p:txBody>
+          <a:bodyPr wrap="square" rtlCol="0">
+            <a:spAutoFit/>
+          </a:bodyPr>
+          <a:lstStyle/>
+          <a:p>
+            <a:r>
+              <a:rPr lang="nb-NO" dirty="0" err="1"/>
+              <a:t>There</a:t>
+            </a:r>
+            <a:r>
+              <a:rPr lang="nb-NO" dirty="0"/>
+              <a:t> </a:t>
+            </a:r>
+            <a:r>
+              <a:rPr lang="nb-NO" dirty="0" err="1"/>
+              <a:t>are</a:t>
+            </a:r>
+            <a:r>
+              <a:rPr lang="nb-NO" dirty="0"/>
+              <a:t> </a:t>
+            </a:r>
+            <a:r>
+              <a:rPr lang="nb-NO" dirty="0" err="1"/>
+              <a:t>no</a:t>
+            </a:r>
+            <a:r>
+              <a:rPr lang="nb-NO" dirty="0"/>
+              <a:t> </a:t>
+            </a:r>
+            <a:r>
+              <a:rPr lang="nb-NO" dirty="0" err="1"/>
+              <a:t>fields</a:t>
+            </a:r>
+            <a:r>
+              <a:rPr lang="nb-NO" dirty="0"/>
+              <a:t> for </a:t>
+            </a:r>
+            <a:r>
+              <a:rPr lang="nb-NO" dirty="0" err="1"/>
+              <a:t>Review</a:t>
+            </a:r>
+            <a:endParaRPr lang="en-GB" dirty="0"/>
+          </a:p>
+        </p:txBody>
+      </p:sp>
     </p:spTree>
     <p:extLst>
       <p:ext uri="{BB962C8B-B14F-4D97-AF65-F5344CB8AC3E}">
@@ -11981,7 +12338,7 @@
           <a:p>
             <a:fld id="{BE0A88F0-556B-4BB7-8AAB-D63AEB65C662}" type="datetime1">
               <a:rPr lang="en-US" smtClean="0"/>
-              <a:t>2/28/2023</a:t>
+              <a:t>3/2/2023</a:t>
             </a:fld>
             <a:endParaRPr lang="en-US"/>
           </a:p>
@@ -12055,8 +12412,8 @@
         </p:nvSpPr>
         <p:spPr>
           <a:xfrm>
-            <a:off x="4261606" y="4312286"/>
-            <a:ext cx="318782" cy="578840"/>
+            <a:off x="4261606" y="4228051"/>
+            <a:ext cx="318782" cy="557868"/>
           </a:xfrm>
           <a:prstGeom prst="rightBrace">
             <a:avLst/>
@@ -12099,7 +12456,7 @@
         </p:nvSpPr>
         <p:spPr>
           <a:xfrm>
-            <a:off x="4580388" y="4417493"/>
+            <a:off x="4689445" y="4322772"/>
             <a:ext cx="947956" cy="368426"/>
           </a:xfrm>
           <a:prstGeom prst="rect">
@@ -12230,7 +12587,9 @@
         </p:nvSpPr>
         <p:spPr/>
         <p:txBody>
-          <a:bodyPr/>
+          <a:bodyPr>
+            <a:normAutofit fontScale="92500" lnSpcReduction="10000"/>
+          </a:bodyPr>
           <a:lstStyle/>
           <a:p>
             <a:r>
@@ -12379,17 +12738,17 @@
               <a:rPr lang="nb-NO" dirty="0"/>
               <a:t> time?</a:t>
             </a:r>
-          </a:p>
-          <a:p>
-            <a:endParaRPr lang="nb-NO" dirty="0"/>
-          </a:p>
-          <a:p>
-            <a:endParaRPr lang="nb-NO" dirty="0"/>
           </a:p>
           <a:p>
             <a:pPr marL="0" indent="0">
               <a:buNone/>
             </a:pPr>
+            <a:endParaRPr lang="nb-NO" dirty="0"/>
+          </a:p>
+          <a:p>
+            <a:pPr marL="0" indent="0">
+              <a:buNone/>
+            </a:pPr>
             <a:r>
               <a:rPr lang="nb-NO" sz="3600" dirty="0" err="1"/>
               <a:t>Next</a:t>
@@ -12406,7 +12765,33 @@
               <a:rPr lang="nb-NO" sz="3600" dirty="0"/>
               <a:t>: 16.03.2023</a:t>
             </a:r>
-            <a:endParaRPr lang="en-GB" sz="3600" dirty="0"/>
+          </a:p>
+          <a:p>
+            <a:r>
+              <a:rPr lang="en-GB" sz="1200" dirty="0"/>
+              <a:t>Agenda</a:t>
+            </a:r>
+          </a:p>
+          <a:p>
+            <a:pPr lvl="1"/>
+            <a:r>
+              <a:rPr lang="en-GB" sz="1000" dirty="0"/>
+              <a:t>Update on progress</a:t>
+            </a:r>
+          </a:p>
+          <a:p>
+            <a:pPr lvl="1"/>
+            <a:r>
+              <a:rPr lang="en-GB" sz="1000" dirty="0"/>
+              <a:t>Review road map</a:t>
+            </a:r>
+          </a:p>
+          <a:p>
+            <a:pPr lvl="1"/>
+            <a:r>
+              <a:rPr lang="en-GB" sz="1000" dirty="0"/>
+              <a:t>Discussion</a:t>
+            </a:r>
           </a:p>
         </p:txBody>
       </p:sp>
@@ -12433,7 +12818,7 @@
           <a:p>
             <a:fld id="{BE0A88F0-556B-4BB7-8AAB-D63AEB65C662}" type="datetime1">
               <a:rPr lang="en-US" smtClean="0"/>
-              <a:t>2/28/2023</a:t>
+              <a:t>3/2/2023</a:t>
             </a:fld>
             <a:endParaRPr lang="en-US"/>
           </a:p>
@@ -13689,6 +14074,9 @@
             <a:endParaRPr lang="nb-NO" dirty="0"/>
           </a:p>
           <a:p>
+            <a:endParaRPr lang="nb-NO" dirty="0"/>
+          </a:p>
+          <a:p>
             <a:r>
               <a:rPr lang="nb-NO" dirty="0"/>
               <a:t>The </a:t>
@@ -13786,7 +14174,7 @@
           <a:p>
             <a:fld id="{BE0A88F0-556B-4BB7-8AAB-D63AEB65C662}" type="datetime1">
               <a:rPr lang="en-US" smtClean="0"/>
-              <a:t>3/1/2023</a:t>
+              <a:t>3/2/2023</a:t>
             </a:fld>
             <a:endParaRPr lang="en-US"/>
           </a:p>
@@ -13870,6 +14258,36 @@
           <a:xfrm>
             <a:off x="1641764" y="2911619"/>
             <a:ext cx="8686800" cy="314325"/>
+          </a:xfrm>
+          <a:prstGeom prst="rect">
+            <a:avLst/>
+          </a:prstGeom>
+        </p:spPr>
+      </p:pic>
+      <p:pic>
+        <p:nvPicPr>
+          <p:cNvPr id="11" name="Picture 10">
+            <a:extLst>
+              <a:ext uri="{FF2B5EF4-FFF2-40B4-BE49-F238E27FC236}">
+                <a16:creationId xmlns:a16="http://schemas.microsoft.com/office/drawing/2014/main" id="{0E7EE6F4-EA57-8638-31FE-7702D057BF15}"/>
+              </a:ext>
+            </a:extLst>
+          </p:cNvPr>
+          <p:cNvPicPr>
+            <a:picLocks noChangeAspect="1"/>
+          </p:cNvPicPr>
+          <p:nvPr/>
+        </p:nvPicPr>
+        <p:blipFill>
+          <a:blip r:embed="rId3"/>
+          <a:stretch>
+            <a:fillRect/>
+          </a:stretch>
+        </p:blipFill>
+        <p:spPr>
+          <a:xfrm>
+            <a:off x="1641764" y="3206268"/>
+            <a:ext cx="8534400" cy="371475"/>
           </a:xfrm>
           <a:prstGeom prst="rect">
             <a:avLst/>
@@ -13962,7 +14380,7 @@
           <a:p>
             <a:fld id="{BE0A88F0-556B-4BB7-8AAB-D63AEB65C662}" type="datetime1">
               <a:rPr lang="en-US" smtClean="0"/>
-              <a:t>3/1/2023</a:t>
+              <a:t>3/2/2023</a:t>
             </a:fld>
             <a:endParaRPr lang="en-US"/>
           </a:p>
@@ -14573,7 +14991,7 @@
           <a:p>
             <a:fld id="{BE0A88F0-556B-4BB7-8AAB-D63AEB65C662}" type="datetime1">
               <a:rPr lang="en-US" smtClean="0"/>
-              <a:t>3/1/2023</a:t>
+              <a:t>3/2/2023</a:t>
             </a:fld>
             <a:endParaRPr lang="en-US"/>
           </a:p>
@@ -14693,8 +15111,8 @@
         </p:blipFill>
         <p:spPr>
           <a:xfrm>
-            <a:off x="130189" y="258617"/>
-            <a:ext cx="11931621" cy="6059027"/>
+            <a:off x="1" y="192505"/>
+            <a:ext cx="12192000" cy="6191251"/>
           </a:xfrm>
         </p:spPr>
       </p:pic>
@@ -14836,8 +15254,8 @@
         </p:blipFill>
         <p:spPr>
           <a:xfrm>
-            <a:off x="118233" y="270923"/>
-            <a:ext cx="11907391" cy="6046722"/>
+            <a:off x="0" y="210882"/>
+            <a:ext cx="12191999" cy="6191249"/>
           </a:xfrm>
         </p:spPr>
       </p:pic>
@@ -15006,8 +15424,8 @@
         </p:blipFill>
         <p:spPr>
           <a:xfrm>
-            <a:off x="73891" y="370898"/>
-            <a:ext cx="12044218" cy="6116204"/>
+            <a:off x="0" y="203149"/>
+            <a:ext cx="12192000" cy="6191250"/>
           </a:xfrm>
           <a:prstGeom prst="rect">
             <a:avLst/>

</xml_diff>